<commit_message>
Presentation: Added to Conclusions
</commit_message>
<xml_diff>
--- a/Presentation/Sprint04 Presentation.pptx
+++ b/Presentation/Sprint04 Presentation.pptx
@@ -6048,7 +6048,7 @@
           <a:p>
             <a:r>
               <a:rPr lang="en-US" sz="4000" dirty="0"/>
-              <a:t>Conclusion</a:t>
+              <a:t>Conclusion / Lessons-Learned</a:t>
             </a:r>
           </a:p>
         </p:txBody>
@@ -6149,7 +6149,37 @@
           </a:bodyPr>
           <a:lstStyle/>
           <a:p>
-            <a:endParaRPr lang="en-US" dirty="0"/>
+            <a:r>
+              <a:rPr lang="en-US" dirty="0"/>
+              <a:t>Cloud integration was challenging, requiring lots of troubleshooting/problem isolation.</a:t>
+            </a:r>
+          </a:p>
+          <a:p>
+            <a:pPr lvl="1"/>
+            <a:r>
+              <a:rPr lang="en-US" dirty="0"/>
+              <a:t>Lesson-learned: start early as this task takes several days</a:t>
+            </a:r>
+          </a:p>
+          <a:p>
+            <a:pPr lvl="1"/>
+            <a:r>
+              <a:rPr lang="en-US" dirty="0"/>
+              <a:t>Lesson-learned: don’t hard-code IP’s in the scripts or config files</a:t>
+            </a:r>
+          </a:p>
+          <a:p>
+            <a:r>
+              <a:rPr lang="en-US" dirty="0"/>
+              <a:t>Some tasks may take collaboration across the team to resolve</a:t>
+            </a:r>
+          </a:p>
+          <a:p>
+            <a:pPr lvl="1"/>
+            <a:r>
+              <a:rPr lang="en-US" dirty="0"/>
+              <a:t>Lesson-learned: lean on your teammates for their expertise and insights; escalate issues before they become problems</a:t>
+            </a:r>
           </a:p>
         </p:txBody>
       </p:sp>

</xml_diff>